<commit_message>
Correcao na imagem Objetivo Alcancado
</commit_message>
<xml_diff>
--- a/Desenvolvimento/img/Imagens Originais/Novo(a) Apresentação PPTX.pptx
+++ b/Desenvolvimento/img/Imagens Originais/Novo(a) Apresentação PPTX.pptx
@@ -3107,13 +3107,13 @@
         </p:nvSpPr>
         <p:spPr>
           <a:xfrm>
-            <a:off x="1995026" y="153626"/>
-            <a:ext cx="6214806" cy="2196410"/>
+            <a:off x="628649" y="153626"/>
+            <a:ext cx="6100615" cy="2380024"/>
           </a:xfrm>
           <a:prstGeom prst="wedgeEllipseCallout">
             <a:avLst>
-              <a:gd name="adj1" fmla="val -46682"/>
-              <a:gd name="adj2" fmla="val 82064"/>
+              <a:gd name="adj1" fmla="val -31693"/>
+              <a:gd name="adj2" fmla="val 86866"/>
             </a:avLst>
           </a:prstGeom>
           <a:ln w="76200"/>
@@ -3138,20 +3138,43 @@
           <a:p>
             <a:pPr algn="ctr"/>
             <a:r>
-              <a:rPr lang="pt-BR" sz="2800" b="1" dirty="0" smtClean="0">
+              <a:rPr lang="pt-BR" sz="3200" b="1" dirty="0" smtClean="0">
                 <a:solidFill>
                   <a:schemeClr val="accent6">
                     <a:lumMod val="50000"/>
                   </a:schemeClr>
                 </a:solidFill>
               </a:rPr>
-              <a:t>ENCONTREI MEU AMIGOS !!       </a:t>
+              <a:t>UAUU !!</a:t>
             </a:r>
           </a:p>
           <a:p>
             <a:pPr algn="ctr"/>
-            <a:r>
-              <a:rPr lang="pt-BR" sz="2800" b="1" dirty="0" smtClean="0">
+            <a:endParaRPr lang="pt-BR" b="1" dirty="0" smtClean="0">
+              <a:solidFill>
+                <a:schemeClr val="accent6">
+                  <a:lumMod val="50000"/>
+                </a:schemeClr>
+              </a:solidFill>
+            </a:endParaRPr>
+          </a:p>
+          <a:p>
+            <a:pPr algn="ctr"/>
+            <a:r>
+              <a:rPr lang="pt-BR" sz="2400" b="1" dirty="0" smtClean="0">
+                <a:solidFill>
+                  <a:schemeClr val="accent6">
+                    <a:lumMod val="50000"/>
+                  </a:schemeClr>
+                </a:solidFill>
+              </a:rPr>
+              <a:t>ENCONTREI MEUS AMIGOS !!       </a:t>
+            </a:r>
+          </a:p>
+          <a:p>
+            <a:pPr algn="ctr"/>
+            <a:r>
+              <a:rPr lang="pt-BR" sz="2400" b="1" dirty="0" smtClean="0">
                 <a:solidFill>
                   <a:schemeClr val="accent6">
                     <a:lumMod val="50000"/>
@@ -3160,7 +3183,7 @@
               </a:rPr>
               <a:t>OBRIGRADO POR ME AJUDAR !!</a:t>
             </a:r>
-            <a:endParaRPr lang="en-US" sz="2800" b="1" dirty="0">
+            <a:endParaRPr lang="en-US" sz="2400" b="1" dirty="0">
               <a:solidFill>
                 <a:schemeClr val="accent6">
                   <a:lumMod val="50000"/>

</xml_diff>